<commit_message>
Upload gene tree scripts
</commit_message>
<xml_diff>
--- a/slides/20201706_phylogenetics_slides.pptx
+++ b/slides/20201706_phylogenetics_slides.pptx
@@ -114,6 +114,11 @@
       </a:defRPr>
     </a:lvl9pPr>
   </p:defaultTextStyle>
+  <p:extLst>
+    <p:ext uri="{EFAFB233-063F-42B5-8137-9DF3F51BA10A}">
+      <p15:sldGuideLst xmlns:p15="http://schemas.microsoft.com/office/powerpoint/2012/main"/>
+    </p:ext>
+  </p:extLst>
 </p:presentation>
 </file>
 
@@ -264,7 +269,7 @@
           <a:p>
             <a:fld id="{F1FFD18D-AAEF-3041-8D25-54EC1121CD54}" type="datetimeFigureOut">
               <a:rPr lang="en-US" smtClean="0"/>
-              <a:t>6/17/20</a:t>
+              <a:t>6/18/20</a:t>
             </a:fld>
             <a:endParaRPr lang="en-US"/>
           </a:p>
@@ -462,7 +467,7 @@
           <a:p>
             <a:fld id="{F1FFD18D-AAEF-3041-8D25-54EC1121CD54}" type="datetimeFigureOut">
               <a:rPr lang="en-US" smtClean="0"/>
-              <a:t>6/17/20</a:t>
+              <a:t>6/18/20</a:t>
             </a:fld>
             <a:endParaRPr lang="en-US"/>
           </a:p>
@@ -670,7 +675,7 @@
           <a:p>
             <a:fld id="{F1FFD18D-AAEF-3041-8D25-54EC1121CD54}" type="datetimeFigureOut">
               <a:rPr lang="en-US" smtClean="0"/>
-              <a:t>6/17/20</a:t>
+              <a:t>6/18/20</a:t>
             </a:fld>
             <a:endParaRPr lang="en-US"/>
           </a:p>
@@ -868,7 +873,7 @@
           <a:p>
             <a:fld id="{F1FFD18D-AAEF-3041-8D25-54EC1121CD54}" type="datetimeFigureOut">
               <a:rPr lang="en-US" smtClean="0"/>
-              <a:t>6/17/20</a:t>
+              <a:t>6/18/20</a:t>
             </a:fld>
             <a:endParaRPr lang="en-US"/>
           </a:p>
@@ -1143,7 +1148,7 @@
           <a:p>
             <a:fld id="{F1FFD18D-AAEF-3041-8D25-54EC1121CD54}" type="datetimeFigureOut">
               <a:rPr lang="en-US" smtClean="0"/>
-              <a:t>6/17/20</a:t>
+              <a:t>6/18/20</a:t>
             </a:fld>
             <a:endParaRPr lang="en-US"/>
           </a:p>
@@ -1408,7 +1413,7 @@
           <a:p>
             <a:fld id="{F1FFD18D-AAEF-3041-8D25-54EC1121CD54}" type="datetimeFigureOut">
               <a:rPr lang="en-US" smtClean="0"/>
-              <a:t>6/17/20</a:t>
+              <a:t>6/18/20</a:t>
             </a:fld>
             <a:endParaRPr lang="en-US"/>
           </a:p>
@@ -1820,7 +1825,7 @@
           <a:p>
             <a:fld id="{F1FFD18D-AAEF-3041-8D25-54EC1121CD54}" type="datetimeFigureOut">
               <a:rPr lang="en-US" smtClean="0"/>
-              <a:t>6/17/20</a:t>
+              <a:t>6/18/20</a:t>
             </a:fld>
             <a:endParaRPr lang="en-US"/>
           </a:p>
@@ -1961,7 +1966,7 @@
           <a:p>
             <a:fld id="{F1FFD18D-AAEF-3041-8D25-54EC1121CD54}" type="datetimeFigureOut">
               <a:rPr lang="en-US" smtClean="0"/>
-              <a:t>6/17/20</a:t>
+              <a:t>6/18/20</a:t>
             </a:fld>
             <a:endParaRPr lang="en-US"/>
           </a:p>
@@ -2074,7 +2079,7 @@
           <a:p>
             <a:fld id="{F1FFD18D-AAEF-3041-8D25-54EC1121CD54}" type="datetimeFigureOut">
               <a:rPr lang="en-US" smtClean="0"/>
-              <a:t>6/17/20</a:t>
+              <a:t>6/18/20</a:t>
             </a:fld>
             <a:endParaRPr lang="en-US"/>
           </a:p>
@@ -2385,7 +2390,7 @@
           <a:p>
             <a:fld id="{F1FFD18D-AAEF-3041-8D25-54EC1121CD54}" type="datetimeFigureOut">
               <a:rPr lang="en-US" smtClean="0"/>
-              <a:t>6/17/20</a:t>
+              <a:t>6/18/20</a:t>
             </a:fld>
             <a:endParaRPr lang="en-US"/>
           </a:p>
@@ -2673,7 +2678,7 @@
           <a:p>
             <a:fld id="{F1FFD18D-AAEF-3041-8D25-54EC1121CD54}" type="datetimeFigureOut">
               <a:rPr lang="en-US" smtClean="0"/>
-              <a:t>6/17/20</a:t>
+              <a:t>6/18/20</a:t>
             </a:fld>
             <a:endParaRPr lang="en-US"/>
           </a:p>
@@ -2914,7 +2919,7 @@
           <a:p>
             <a:fld id="{F1FFD18D-AAEF-3041-8D25-54EC1121CD54}" type="datetimeFigureOut">
               <a:rPr lang="en-US" smtClean="0"/>
-              <a:t>6/17/20</a:t>
+              <a:t>6/18/20</a:t>
             </a:fld>
             <a:endParaRPr lang="en-US"/>
           </a:p>
@@ -3811,8 +3816,8 @@
         </p:nvSpPr>
         <p:spPr>
           <a:xfrm>
-            <a:off x="838200" y="777409"/>
-            <a:ext cx="10515600" cy="5355761"/>
+            <a:off x="533400" y="795338"/>
+            <a:ext cx="11353800" cy="5355761"/>
           </a:xfrm>
         </p:spPr>
         <p:txBody>
@@ -3858,7 +3863,7 @@
             </a:r>
             <a:r>
               <a:rPr lang="en-US" sz="2800" dirty="0"/>
-              <a:t> are awesome for larger phylogenies</a:t>
+              <a:t> are good for larger phylogenies but take a long time</a:t>
             </a:r>
           </a:p>
           <a:p>

</xml_diff>